<commit_message>
added last slide about collision
</commit_message>
<xml_diff>
--- a/codemotion.pptx
+++ b/codemotion.pptx
@@ -306,7 +306,7 @@
           <a:p>
             <a:fld id="{DC661A4A-D0C3-4623-84C2-FD4286BDBB96}" type="datetimeFigureOut">
               <a:rPr lang="it-IT" smtClean="0"/>
-              <a:t>06/04/2014</a:t>
+              <a:t>07/04/2014</a:t>
             </a:fld>
             <a:endParaRPr lang="it-IT"/>
           </a:p>
@@ -8421,7 +8421,15 @@
           <a:p>
             <a:r>
               <a:rPr lang="en-US" dirty="0" smtClean="0"/>
-              <a:t>More complex is the engine, more computation is needed</a:t>
+              <a:t>More complex is the engine, more computation is </a:t>
+            </a:r>
+            <a:r>
+              <a:rPr lang="en-US" dirty="0" smtClean="0"/>
+              <a:t>needed. </a:t>
+            </a:r>
+            <a:r>
+              <a:rPr lang="en-US" smtClean="0"/>
+              <a:t>Choose wisely!</a:t>
             </a:r>
             <a:endParaRPr lang="en-US" dirty="0" smtClean="0"/>
           </a:p>
@@ -8777,9 +8785,7 @@
           </p:nvPr>
         </p:nvSpPr>
         <p:spPr>
-          <a:solidFill>
-            <a:schemeClr val="accent2"/>
-          </a:solidFill>
+          <a:noFill/>
         </p:spPr>
         <p:txBody>
           <a:bodyPr>
@@ -8788,17 +8794,345 @@
           <a:lstStyle/>
           <a:p>
             <a:pPr marL="0" indent="0">
+              <a:lnSpc>
+                <a:spcPct val="100000"/>
+              </a:lnSpc>
+              <a:spcBef>
+                <a:spcPts val="0"/>
+              </a:spcBef>
               <a:buNone/>
             </a:pPr>
             <a:r>
-              <a:rPr lang="en-US" dirty="0" err="1" smtClean="0"/>
-              <a:t>Fillme</a:t>
-            </a:r>
-            <a:r>
-              <a:rPr lang="en-US" smtClean="0"/>
-              <a:t>!</a:t>
-            </a:r>
-            <a:endParaRPr lang="en-US" dirty="0" smtClean="0"/>
+              <a:rPr lang="en-US" sz="1800" dirty="0" smtClean="0">
+                <a:latin typeface="Consolas" panose="020B0609020204030204" pitchFamily="49" charset="0"/>
+                <a:cs typeface="Consolas" panose="020B0609020204030204" pitchFamily="49" charset="0"/>
+              </a:rPr>
+              <a:t>function create() { 	</a:t>
+            </a:r>
+            <a:r>
+              <a:rPr lang="en-US" sz="1800" dirty="0" err="1" smtClean="0">
+                <a:latin typeface="Consolas" panose="020B0609020204030204" pitchFamily="49" charset="0"/>
+                <a:cs typeface="Consolas" panose="020B0609020204030204" pitchFamily="49" charset="0"/>
+              </a:rPr>
+              <a:t>game.physics.startSystem</a:t>
+            </a:r>
+            <a:r>
+              <a:rPr lang="en-US" sz="1800" dirty="0" smtClean="0">
+                <a:latin typeface="Consolas" panose="020B0609020204030204" pitchFamily="49" charset="0"/>
+                <a:cs typeface="Consolas" panose="020B0609020204030204" pitchFamily="49" charset="0"/>
+              </a:rPr>
+              <a:t>(</a:t>
+            </a:r>
+            <a:r>
+              <a:rPr lang="en-US" sz="1800" dirty="0" err="1" smtClean="0">
+                <a:latin typeface="Consolas" panose="020B0609020204030204" pitchFamily="49" charset="0"/>
+                <a:cs typeface="Consolas" panose="020B0609020204030204" pitchFamily="49" charset="0"/>
+              </a:rPr>
+              <a:t>Phaser.Physics.ARCADE</a:t>
+            </a:r>
+            <a:r>
+              <a:rPr lang="en-US" sz="1800" dirty="0" smtClean="0">
+                <a:latin typeface="Consolas" panose="020B0609020204030204" pitchFamily="49" charset="0"/>
+                <a:cs typeface="Consolas" panose="020B0609020204030204" pitchFamily="49" charset="0"/>
+              </a:rPr>
+              <a:t>);</a:t>
+            </a:r>
+          </a:p>
+          <a:p>
+            <a:pPr marL="0" indent="0">
+              <a:lnSpc>
+                <a:spcPct val="100000"/>
+              </a:lnSpc>
+              <a:spcBef>
+                <a:spcPts val="0"/>
+              </a:spcBef>
+              <a:buNone/>
+            </a:pPr>
+            <a:r>
+              <a:rPr lang="en-US" sz="1800" dirty="0" smtClean="0">
+                <a:latin typeface="Consolas" panose="020B0609020204030204" pitchFamily="49" charset="0"/>
+                <a:cs typeface="Consolas" panose="020B0609020204030204" pitchFamily="49" charset="0"/>
+              </a:rPr>
+              <a:t>	sprite = </a:t>
+            </a:r>
+            <a:r>
+              <a:rPr lang="en-US" sz="1800" dirty="0" err="1">
+                <a:latin typeface="Consolas" panose="020B0609020204030204" pitchFamily="49" charset="0"/>
+                <a:cs typeface="Consolas" panose="020B0609020204030204" pitchFamily="49" charset="0"/>
+              </a:rPr>
+              <a:t>game.add.sprite</a:t>
+            </a:r>
+            <a:r>
+              <a:rPr lang="en-US" sz="1800" dirty="0">
+                <a:latin typeface="Consolas" panose="020B0609020204030204" pitchFamily="49" charset="0"/>
+                <a:cs typeface="Consolas" panose="020B0609020204030204" pitchFamily="49" charset="0"/>
+              </a:rPr>
+              <a:t>(0, </a:t>
+            </a:r>
+            <a:r>
+              <a:rPr lang="en-US" sz="1800" dirty="0" smtClean="0">
+                <a:latin typeface="Consolas" panose="020B0609020204030204" pitchFamily="49" charset="0"/>
+                <a:cs typeface="Consolas" panose="020B0609020204030204" pitchFamily="49" charset="0"/>
+              </a:rPr>
+              <a:t>0, </a:t>
+            </a:r>
+            <a:r>
+              <a:rPr lang="en-US" sz="1800" dirty="0">
+                <a:latin typeface="Consolas" panose="020B0609020204030204" pitchFamily="49" charset="0"/>
+                <a:cs typeface="Consolas" panose="020B0609020204030204" pitchFamily="49" charset="0"/>
+              </a:rPr>
+              <a:t>'</a:t>
+            </a:r>
+            <a:r>
+              <a:rPr lang="en-US" sz="1800" dirty="0" smtClean="0">
+                <a:latin typeface="Consolas" panose="020B0609020204030204" pitchFamily="49" charset="0"/>
+                <a:cs typeface="Consolas" panose="020B0609020204030204" pitchFamily="49" charset="0"/>
+              </a:rPr>
+              <a:t>image');</a:t>
+            </a:r>
+          </a:p>
+          <a:p>
+            <a:pPr marL="0" indent="0">
+              <a:lnSpc>
+                <a:spcPct val="100000"/>
+              </a:lnSpc>
+              <a:spcBef>
+                <a:spcPts val="0"/>
+              </a:spcBef>
+              <a:buNone/>
+            </a:pPr>
+            <a:r>
+              <a:rPr lang="en-US" sz="1800" dirty="0" smtClean="0">
+                <a:latin typeface="Consolas" panose="020B0609020204030204" pitchFamily="49" charset="0"/>
+                <a:cs typeface="Consolas" panose="020B0609020204030204" pitchFamily="49" charset="0"/>
+              </a:rPr>
+              <a:t>	</a:t>
+            </a:r>
+            <a:r>
+              <a:rPr lang="en-US" sz="1800" dirty="0" err="1" smtClean="0">
+                <a:latin typeface="Consolas" panose="020B0609020204030204" pitchFamily="49" charset="0"/>
+                <a:cs typeface="Consolas" panose="020B0609020204030204" pitchFamily="49" charset="0"/>
+              </a:rPr>
+              <a:t>game.physics.enable</a:t>
+            </a:r>
+            <a:r>
+              <a:rPr lang="en-US" sz="1800" dirty="0" smtClean="0">
+                <a:latin typeface="Consolas" panose="020B0609020204030204" pitchFamily="49" charset="0"/>
+                <a:cs typeface="Consolas" panose="020B0609020204030204" pitchFamily="49" charset="0"/>
+              </a:rPr>
+              <a:t>(sprite, </a:t>
+            </a:r>
+            <a:r>
+              <a:rPr lang="en-US" sz="1800" dirty="0" err="1">
+                <a:latin typeface="Consolas" panose="020B0609020204030204" pitchFamily="49" charset="0"/>
+                <a:cs typeface="Consolas" panose="020B0609020204030204" pitchFamily="49" charset="0"/>
+              </a:rPr>
+              <a:t>Phaser.Physics.ARCADE</a:t>
+            </a:r>
+            <a:r>
+              <a:rPr lang="en-US" sz="1800" dirty="0" smtClean="0">
+                <a:latin typeface="Consolas" panose="020B0609020204030204" pitchFamily="49" charset="0"/>
+                <a:cs typeface="Consolas" panose="020B0609020204030204" pitchFamily="49" charset="0"/>
+              </a:rPr>
+              <a:t>);</a:t>
+            </a:r>
+          </a:p>
+          <a:p>
+            <a:pPr marL="0" indent="0">
+              <a:lnSpc>
+                <a:spcPct val="100000"/>
+              </a:lnSpc>
+              <a:spcBef>
+                <a:spcPts val="0"/>
+              </a:spcBef>
+              <a:buNone/>
+            </a:pPr>
+            <a:r>
+              <a:rPr lang="en-US" sz="1800" dirty="0" smtClean="0">
+                <a:latin typeface="Consolas" panose="020B0609020204030204" pitchFamily="49" charset="0"/>
+                <a:cs typeface="Consolas" panose="020B0609020204030204" pitchFamily="49" charset="0"/>
+              </a:rPr>
+              <a:t>	</a:t>
+            </a:r>
+            <a:r>
+              <a:rPr lang="en-US" sz="1800" dirty="0" err="1" smtClean="0">
+                <a:latin typeface="Consolas" panose="020B0609020204030204" pitchFamily="49" charset="0"/>
+                <a:cs typeface="Consolas" panose="020B0609020204030204" pitchFamily="49" charset="0"/>
+              </a:rPr>
+              <a:t>sprite.body.collideWorldBounds</a:t>
+            </a:r>
+            <a:r>
+              <a:rPr lang="en-US" sz="1800" dirty="0" smtClean="0">
+                <a:latin typeface="Consolas" panose="020B0609020204030204" pitchFamily="49" charset="0"/>
+                <a:cs typeface="Consolas" panose="020B0609020204030204" pitchFamily="49" charset="0"/>
+              </a:rPr>
+              <a:t> </a:t>
+            </a:r>
+            <a:r>
+              <a:rPr lang="en-US" sz="1800" dirty="0">
+                <a:latin typeface="Consolas" panose="020B0609020204030204" pitchFamily="49" charset="0"/>
+                <a:cs typeface="Consolas" panose="020B0609020204030204" pitchFamily="49" charset="0"/>
+              </a:rPr>
+              <a:t>= true</a:t>
+            </a:r>
+            <a:r>
+              <a:rPr lang="en-US" sz="1800" dirty="0" smtClean="0">
+                <a:latin typeface="Consolas" panose="020B0609020204030204" pitchFamily="49" charset="0"/>
+                <a:cs typeface="Consolas" panose="020B0609020204030204" pitchFamily="49" charset="0"/>
+              </a:rPr>
+              <a:t>;</a:t>
+            </a:r>
+          </a:p>
+          <a:p>
+            <a:pPr marL="0" indent="0">
+              <a:lnSpc>
+                <a:spcPct val="100000"/>
+              </a:lnSpc>
+              <a:spcBef>
+                <a:spcPts val="0"/>
+              </a:spcBef>
+              <a:buNone/>
+            </a:pPr>
+            <a:r>
+              <a:rPr lang="en-US" sz="1800" dirty="0" smtClean="0">
+                <a:latin typeface="Consolas" panose="020B0609020204030204" pitchFamily="49" charset="0"/>
+                <a:cs typeface="Consolas" panose="020B0609020204030204" pitchFamily="49" charset="0"/>
+              </a:rPr>
+              <a:t>	</a:t>
+            </a:r>
+            <a:r>
+              <a:rPr lang="en-US" sz="1800" dirty="0" err="1" smtClean="0">
+                <a:latin typeface="Consolas" panose="020B0609020204030204" pitchFamily="49" charset="0"/>
+                <a:cs typeface="Consolas" panose="020B0609020204030204" pitchFamily="49" charset="0"/>
+              </a:rPr>
+              <a:t>sprite.body.bounce.set</a:t>
+            </a:r>
+            <a:r>
+              <a:rPr lang="en-US" sz="1800" dirty="0" smtClean="0">
+                <a:latin typeface="Consolas" panose="020B0609020204030204" pitchFamily="49" charset="0"/>
+                <a:cs typeface="Consolas" panose="020B0609020204030204" pitchFamily="49" charset="0"/>
+              </a:rPr>
+              <a:t>(1);</a:t>
+            </a:r>
+          </a:p>
+          <a:p>
+            <a:pPr marL="0" indent="0">
+              <a:lnSpc>
+                <a:spcPct val="100000"/>
+              </a:lnSpc>
+              <a:spcBef>
+                <a:spcPts val="0"/>
+              </a:spcBef>
+              <a:buNone/>
+            </a:pPr>
+            <a:r>
+              <a:rPr lang="en-US" sz="1800" dirty="0" smtClean="0">
+                <a:latin typeface="Consolas" panose="020B0609020204030204" pitchFamily="49" charset="0"/>
+                <a:cs typeface="Consolas" panose="020B0609020204030204" pitchFamily="49" charset="0"/>
+              </a:rPr>
+              <a:t>}</a:t>
+            </a:r>
+          </a:p>
+          <a:p>
+            <a:pPr marL="0" indent="0">
+              <a:lnSpc>
+                <a:spcPct val="100000"/>
+              </a:lnSpc>
+              <a:spcBef>
+                <a:spcPts val="0"/>
+              </a:spcBef>
+              <a:buNone/>
+            </a:pPr>
+            <a:endParaRPr lang="en-US" sz="1800" dirty="0" smtClean="0">
+              <a:latin typeface="Consolas" panose="020B0609020204030204" pitchFamily="49" charset="0"/>
+              <a:cs typeface="Consolas" panose="020B0609020204030204" pitchFamily="49" charset="0"/>
+            </a:endParaRPr>
+          </a:p>
+          <a:p>
+            <a:pPr marL="0" indent="0">
+              <a:lnSpc>
+                <a:spcPct val="100000"/>
+              </a:lnSpc>
+              <a:spcBef>
+                <a:spcPts val="0"/>
+              </a:spcBef>
+              <a:buNone/>
+            </a:pPr>
+            <a:r>
+              <a:rPr lang="en-US" sz="1800" dirty="0" smtClean="0">
+                <a:latin typeface="Consolas" panose="020B0609020204030204" pitchFamily="49" charset="0"/>
+                <a:cs typeface="Consolas" panose="020B0609020204030204" pitchFamily="49" charset="0"/>
+              </a:rPr>
+              <a:t>function update() {</a:t>
+            </a:r>
+          </a:p>
+          <a:p>
+            <a:pPr marL="0" indent="0">
+              <a:lnSpc>
+                <a:spcPct val="100000"/>
+              </a:lnSpc>
+              <a:spcBef>
+                <a:spcPts val="0"/>
+              </a:spcBef>
+              <a:buNone/>
+            </a:pPr>
+            <a:r>
+              <a:rPr lang="en-US" sz="1800" dirty="0" smtClean="0">
+                <a:latin typeface="Consolas" panose="020B0609020204030204" pitchFamily="49" charset="0"/>
+                <a:cs typeface="Consolas" panose="020B0609020204030204" pitchFamily="49" charset="0"/>
+              </a:rPr>
+              <a:t>	</a:t>
+            </a:r>
+            <a:r>
+              <a:rPr lang="en-US" sz="1800" dirty="0" err="1" smtClean="0">
+                <a:latin typeface="Consolas" panose="020B0609020204030204" pitchFamily="49" charset="0"/>
+                <a:cs typeface="Consolas" panose="020B0609020204030204" pitchFamily="49" charset="0"/>
+              </a:rPr>
+              <a:t>game.physics.arcade.collide</a:t>
+            </a:r>
+            <a:r>
+              <a:rPr lang="en-US" sz="1800" dirty="0" smtClean="0">
+                <a:latin typeface="Consolas" panose="020B0609020204030204" pitchFamily="49" charset="0"/>
+                <a:cs typeface="Consolas" panose="020B0609020204030204" pitchFamily="49" charset="0"/>
+              </a:rPr>
+              <a:t>(sprite, [tilemap, group], function(sprite, </a:t>
+            </a:r>
+            <a:r>
+              <a:rPr lang="en-US" sz="1800" dirty="0">
+                <a:latin typeface="Consolas" panose="020B0609020204030204" pitchFamily="49" charset="0"/>
+                <a:cs typeface="Consolas" panose="020B0609020204030204" pitchFamily="49" charset="0"/>
+              </a:rPr>
+              <a:t>o) </a:t>
+            </a:r>
+            <a:r>
+              <a:rPr lang="en-US" sz="1800" dirty="0" smtClean="0">
+                <a:latin typeface="Consolas" panose="020B0609020204030204" pitchFamily="49" charset="0"/>
+                <a:cs typeface="Consolas" panose="020B0609020204030204" pitchFamily="49" charset="0"/>
+              </a:rPr>
+              <a:t>{ … });</a:t>
+            </a:r>
+          </a:p>
+          <a:p>
+            <a:pPr marL="0" indent="0">
+              <a:lnSpc>
+                <a:spcPct val="100000"/>
+              </a:lnSpc>
+              <a:spcBef>
+                <a:spcPts val="0"/>
+              </a:spcBef>
+              <a:buNone/>
+            </a:pPr>
+            <a:r>
+              <a:rPr lang="en-US" sz="1800" dirty="0">
+                <a:latin typeface="Consolas" panose="020B0609020204030204" pitchFamily="49" charset="0"/>
+                <a:cs typeface="Consolas" panose="020B0609020204030204" pitchFamily="49" charset="0"/>
+              </a:rPr>
+              <a:t>}</a:t>
+            </a:r>
+            <a:endParaRPr lang="en-US" sz="1800" dirty="0" smtClean="0">
+              <a:latin typeface="Consolas" panose="020B0609020204030204" pitchFamily="49" charset="0"/>
+              <a:cs typeface="Consolas" panose="020B0609020204030204" pitchFamily="49" charset="0"/>
+            </a:endParaRPr>
           </a:p>
         </p:txBody>
       </p:sp>
@@ -12143,7 +12477,7 @@
           <a:p>
             <a:r>
               <a:rPr lang="en-US" dirty="0" smtClean="0"/>
-              <a:t>Deployment on mobile devices</a:t>
+              <a:t>Deployment</a:t>
             </a:r>
             <a:endParaRPr lang="en-US" dirty="0"/>
           </a:p>
@@ -12794,13 +13128,7 @@
               <a:rPr lang="en-GB" sz="2000" dirty="0" smtClean="0">
                 <a:hlinkClick r:id="rId3"/>
               </a:rPr>
-              <a:t>http</a:t>
-            </a:r>
-            <a:r>
-              <a:rPr lang="en-GB" sz="2000" dirty="0" smtClean="0">
-                <a:hlinkClick r:id="rId3"/>
-              </a:rPr>
-              <a:t>://kongregate.com</a:t>
+              <a:t>http://kongregate.com</a:t>
             </a:r>
             <a:endParaRPr lang="en-GB" sz="2000" dirty="0" smtClean="0"/>
           </a:p>
@@ -12913,13 +13241,8 @@
           <a:p>
             <a:r>
               <a:rPr lang="en-GB" dirty="0" smtClean="0"/>
-              <a:t>Intel </a:t>
-            </a:r>
-            <a:r>
-              <a:rPr lang="en-GB" dirty="0" smtClean="0"/>
-              <a:t>XDK</a:t>
-            </a:r>
-            <a:endParaRPr lang="en-GB" dirty="0" smtClean="0"/>
+              <a:t>Intel XDK</a:t>
+            </a:r>
           </a:p>
           <a:p>
             <a:pPr lvl="1"/>
@@ -13428,21 +13751,8 @@
             <a:pPr lvl="1"/>
             <a:r>
               <a:rPr lang="en-US" dirty="0" smtClean="0"/>
-              <a:t>“arcade</a:t>
-            </a:r>
-            <a:r>
-              <a:rPr lang="en-US" dirty="0" smtClean="0"/>
-              <a:t>”: simple AABB </a:t>
-            </a:r>
-            <a:r>
-              <a:rPr lang="en-US" dirty="0" smtClean="0"/>
-              <a:t>physics </a:t>
-            </a:r>
-            <a:r>
-              <a:rPr lang="en-US" dirty="0" smtClean="0"/>
-              <a:t>engine</a:t>
-            </a:r>
-            <a:endParaRPr lang="en-US" dirty="0" smtClean="0"/>
+              <a:t>“arcade”: simple AABB physics engine</a:t>
+            </a:r>
           </a:p>
           <a:p>
             <a:pPr lvl="1"/>

</xml_diff>

<commit_message>
aggiunti loghi overvolt e turbo
</commit_message>
<xml_diff>
--- a/codemotion.pptx
+++ b/codemotion.pptx
@@ -304,7 +304,7 @@
           <a:p>
             <a:fld id="{DC661A4A-D0C3-4623-84C2-FD4286BDBB96}" type="datetimeFigureOut">
               <a:rPr lang="it-IT" smtClean="0"/>
-              <a:t>07/04/2014</a:t>
+              <a:t>08/04/2014</a:t>
             </a:fld>
             <a:endParaRPr lang="it-IT"/>
           </a:p>
@@ -5437,26 +5437,14 @@
             </a:r>
             <a:r>
               <a:rPr lang="en-US" dirty="0" smtClean="0"/>
-              <a:t>as a </a:t>
-            </a:r>
-            <a:r>
-              <a:rPr lang="en-US" dirty="0" smtClean="0"/>
-              <a:t>set of coordinates </a:t>
-            </a:r>
-            <a:r>
-              <a:rPr lang="en-US" dirty="0" smtClean="0"/>
-              <a:t/>
+              <a:t>as a set of coordinates </a:t>
             </a:r>
             <a:br>
               <a:rPr lang="en-US" dirty="0" smtClean="0"/>
             </a:br>
             <a:r>
               <a:rPr lang="en-US" dirty="0" smtClean="0"/>
-              <a:t>and </a:t>
-            </a:r>
-            <a:r>
-              <a:rPr lang="en-US" dirty="0" smtClean="0"/>
-              <a:t>sizes</a:t>
+              <a:t>and sizes</a:t>
             </a:r>
           </a:p>
           <a:p>
@@ -8548,21 +8536,7 @@
                 <a:latin typeface="Consolas" panose="020B0609020204030204" pitchFamily="49" charset="0"/>
                 <a:cs typeface="Consolas" panose="020B0609020204030204" pitchFamily="49" charset="0"/>
               </a:rPr>
-              <a:t>(sprite, [tilemap, group], function(sprite, </a:t>
-            </a:r>
-            <a:r>
-              <a:rPr lang="en-US" sz="1800" dirty="0" smtClean="0">
-                <a:latin typeface="Consolas" panose="020B0609020204030204" pitchFamily="49" charset="0"/>
-                <a:cs typeface="Consolas" panose="020B0609020204030204" pitchFamily="49" charset="0"/>
-              </a:rPr>
-              <a:t>other) </a:t>
-            </a:r>
-            <a:r>
-              <a:rPr lang="en-US" sz="1800" dirty="0" smtClean="0">
-                <a:latin typeface="Consolas" panose="020B0609020204030204" pitchFamily="49" charset="0"/>
-                <a:cs typeface="Consolas" panose="020B0609020204030204" pitchFamily="49" charset="0"/>
-              </a:rPr>
-              <a:t>{ … });</a:t>
+              <a:t>(sprite, [tilemap, group], function(sprite, other) { … });</a:t>
             </a:r>
           </a:p>
           <a:p>
@@ -8795,14 +8769,13 @@
             </a:r>
             <a:r>
               <a:rPr lang="en-US" dirty="0" smtClean="0"/>
-              <a:t>: crazy slot cars (coming soon!)</a:t>
-            </a:r>
-          </a:p>
-          <a:p>
+              <a:t>: crazy slot cars (coming soon</a:t>
+            </a:r>
             <a:r>
               <a:rPr lang="en-US" dirty="0" smtClean="0"/>
-              <a:t>First game made: “Who wants to be a fake millionaire” on Nintendo DS as homebrew</a:t>
-            </a:r>
+              <a:t>!)</a:t>
+            </a:r>
+            <a:endParaRPr lang="en-US" dirty="0" smtClean="0"/>
           </a:p>
         </p:txBody>
       </p:sp>
@@ -8865,6 +8838,66 @@
           </a:p>
         </p:txBody>
       </p:sp>
+      <p:pic>
+        <p:nvPicPr>
+          <p:cNvPr id="6" name="Immagine 5"/>
+          <p:cNvPicPr>
+            <a:picLocks noChangeAspect="1"/>
+          </p:cNvPicPr>
+          <p:nvPr/>
+        </p:nvPicPr>
+        <p:blipFill>
+          <a:blip r:embed="rId4">
+            <a:extLst>
+              <a:ext uri="{28A0092B-C50C-407E-A947-70E740481C1C}">
+                <a14:useLocalDpi xmlns:a14="http://schemas.microsoft.com/office/drawing/2010/main" val="0"/>
+              </a:ext>
+            </a:extLst>
+          </a:blip>
+          <a:stretch>
+            <a:fillRect/>
+          </a:stretch>
+        </p:blipFill>
+        <p:spPr>
+          <a:xfrm>
+            <a:off x="5126176" y="3722303"/>
+            <a:ext cx="2663548" cy="2663548"/>
+          </a:xfrm>
+          <a:prstGeom prst="rect">
+            <a:avLst/>
+          </a:prstGeom>
+        </p:spPr>
+      </p:pic>
+      <p:pic>
+        <p:nvPicPr>
+          <p:cNvPr id="8" name="Immagine 7"/>
+          <p:cNvPicPr>
+            <a:picLocks noChangeAspect="1"/>
+          </p:cNvPicPr>
+          <p:nvPr/>
+        </p:nvPicPr>
+        <p:blipFill>
+          <a:blip r:embed="rId5">
+            <a:extLst>
+              <a:ext uri="{28A0092B-C50C-407E-A947-70E740481C1C}">
+                <a14:useLocalDpi xmlns:a14="http://schemas.microsoft.com/office/drawing/2010/main" val="0"/>
+              </a:ext>
+            </a:extLst>
+          </a:blip>
+          <a:stretch>
+            <a:fillRect/>
+          </a:stretch>
+        </p:blipFill>
+        <p:spPr>
+          <a:xfrm>
+            <a:off x="1187624" y="3648477"/>
+            <a:ext cx="3748266" cy="2811200"/>
+          </a:xfrm>
+          <a:prstGeom prst="rect">
+            <a:avLst/>
+          </a:prstGeom>
+        </p:spPr>
+      </p:pic>
     </p:spTree>
     <p:extLst>
       <p:ext uri="{BB962C8B-B14F-4D97-AF65-F5344CB8AC3E}">
@@ -13712,11 +13745,7 @@
             <a:pPr lvl="1"/>
             <a:r>
               <a:rPr lang="en-US" dirty="0" smtClean="0"/>
-              <a:t>update </a:t>
-            </a:r>
-            <a:r>
-              <a:rPr lang="en-US" dirty="0" smtClean="0"/>
-              <a:t>loop executes game logic</a:t>
+              <a:t>update loop executes game logic</a:t>
             </a:r>
           </a:p>
           <a:p>

</xml_diff>